<commit_message>
Aktualisieren der README und Progress bar verschönern
Progressbar zu Präsentation hinzugefügt. Mockup erstellt und Planung.docx aktualisiert.
</commit_message>
<xml_diff>
--- a/Dokumentation/Präsentation/Push-Notifications.pptx
+++ b/Dokumentation/Präsentation/Push-Notifications.pptx
@@ -11,9 +11,9 @@
     <p:sldId id="258" r:id="rId5"/>
     <p:sldId id="261" r:id="rId6"/>
     <p:sldId id="262" r:id="rId7"/>
-    <p:sldId id="263" r:id="rId8"/>
-    <p:sldId id="264" r:id="rId9"/>
-    <p:sldId id="265" r:id="rId10"/>
+    <p:sldId id="265" r:id="rId8"/>
+    <p:sldId id="263" r:id="rId9"/>
+    <p:sldId id="264" r:id="rId10"/>
     <p:sldId id="257" r:id="rId11"/>
   </p:sldIdLst>
   <p:sldSz cx="12192000" cy="6858000"/>
@@ -843,7 +843,7 @@
           <a:p>
             <a:fld id="{6D84748D-454D-46DF-9289-A215CF23A2F8}" type="datetimeFigureOut">
               <a:rPr lang="de-DE" smtClean="0"/>
-              <a:t>28.09.2021</a:t>
+              <a:t>29.10.2021</a:t>
             </a:fld>
             <a:endParaRPr lang="de-DE"/>
           </a:p>
@@ -1094,7 +1094,7 @@
           <a:p>
             <a:fld id="{6D84748D-454D-46DF-9289-A215CF23A2F8}" type="datetimeFigureOut">
               <a:rPr lang="de-DE" smtClean="0"/>
-              <a:t>28.09.2021</a:t>
+              <a:t>29.10.2021</a:t>
             </a:fld>
             <a:endParaRPr lang="de-DE"/>
           </a:p>
@@ -1408,7 +1408,7 @@
           <a:p>
             <a:fld id="{6D84748D-454D-46DF-9289-A215CF23A2F8}" type="datetimeFigureOut">
               <a:rPr lang="de-DE" smtClean="0"/>
-              <a:t>28.09.2021</a:t>
+              <a:t>29.10.2021</a:t>
             </a:fld>
             <a:endParaRPr lang="de-DE"/>
           </a:p>
@@ -1749,7 +1749,7 @@
           <a:p>
             <a:fld id="{6D84748D-454D-46DF-9289-A215CF23A2F8}" type="datetimeFigureOut">
               <a:rPr lang="de-DE" smtClean="0"/>
-              <a:t>28.09.2021</a:t>
+              <a:t>29.10.2021</a:t>
             </a:fld>
             <a:endParaRPr lang="de-DE"/>
           </a:p>
@@ -2063,7 +2063,7 @@
           <a:p>
             <a:fld id="{6D84748D-454D-46DF-9289-A215CF23A2F8}" type="datetimeFigureOut">
               <a:rPr lang="de-DE" smtClean="0"/>
-              <a:t>28.09.2021</a:t>
+              <a:t>29.10.2021</a:t>
             </a:fld>
             <a:endParaRPr lang="de-DE"/>
           </a:p>
@@ -2456,7 +2456,7 @@
           <a:p>
             <a:fld id="{6D84748D-454D-46DF-9289-A215CF23A2F8}" type="datetimeFigureOut">
               <a:rPr lang="de-DE" smtClean="0"/>
-              <a:t>28.09.2021</a:t>
+              <a:t>29.10.2021</a:t>
             </a:fld>
             <a:endParaRPr lang="de-DE"/>
           </a:p>
@@ -2626,7 +2626,7 @@
           <a:p>
             <a:fld id="{6D84748D-454D-46DF-9289-A215CF23A2F8}" type="datetimeFigureOut">
               <a:rPr lang="de-DE" smtClean="0"/>
-              <a:t>28.09.2021</a:t>
+              <a:t>29.10.2021</a:t>
             </a:fld>
             <a:endParaRPr lang="de-DE"/>
           </a:p>
@@ -2806,7 +2806,7 @@
           <a:p>
             <a:fld id="{6D84748D-454D-46DF-9289-A215CF23A2F8}" type="datetimeFigureOut">
               <a:rPr lang="de-DE" smtClean="0"/>
-              <a:t>28.09.2021</a:t>
+              <a:t>29.10.2021</a:t>
             </a:fld>
             <a:endParaRPr lang="de-DE"/>
           </a:p>
@@ -2982,7 +2982,7 @@
           <a:p>
             <a:fld id="{6D84748D-454D-46DF-9289-A215CF23A2F8}" type="datetimeFigureOut">
               <a:rPr lang="de-DE" smtClean="0"/>
-              <a:t>28.09.2021</a:t>
+              <a:t>29.10.2021</a:t>
             </a:fld>
             <a:endParaRPr lang="de-DE"/>
           </a:p>
@@ -3229,7 +3229,7 @@
           <a:p>
             <a:fld id="{6D84748D-454D-46DF-9289-A215CF23A2F8}" type="datetimeFigureOut">
               <a:rPr lang="de-DE" smtClean="0"/>
-              <a:t>28.09.2021</a:t>
+              <a:t>29.10.2021</a:t>
             </a:fld>
             <a:endParaRPr lang="de-DE"/>
           </a:p>
@@ -3461,7 +3461,7 @@
           <a:p>
             <a:fld id="{6D84748D-454D-46DF-9289-A215CF23A2F8}" type="datetimeFigureOut">
               <a:rPr lang="de-DE" smtClean="0"/>
-              <a:t>28.09.2021</a:t>
+              <a:t>29.10.2021</a:t>
             </a:fld>
             <a:endParaRPr lang="de-DE"/>
           </a:p>
@@ -3835,7 +3835,7 @@
           <a:p>
             <a:fld id="{6D84748D-454D-46DF-9289-A215CF23A2F8}" type="datetimeFigureOut">
               <a:rPr lang="de-DE" smtClean="0"/>
-              <a:t>28.09.2021</a:t>
+              <a:t>29.10.2021</a:t>
             </a:fld>
             <a:endParaRPr lang="de-DE"/>
           </a:p>
@@ -3958,7 +3958,7 @@
           <a:p>
             <a:fld id="{6D84748D-454D-46DF-9289-A215CF23A2F8}" type="datetimeFigureOut">
               <a:rPr lang="de-DE" smtClean="0"/>
-              <a:t>28.09.2021</a:t>
+              <a:t>29.10.2021</a:t>
             </a:fld>
             <a:endParaRPr lang="de-DE"/>
           </a:p>
@@ -4053,7 +4053,7 @@
           <a:p>
             <a:fld id="{6D84748D-454D-46DF-9289-A215CF23A2F8}" type="datetimeFigureOut">
               <a:rPr lang="de-DE" smtClean="0"/>
-              <a:t>28.09.2021</a:t>
+              <a:t>29.10.2021</a:t>
             </a:fld>
             <a:endParaRPr lang="de-DE"/>
           </a:p>
@@ -4308,7 +4308,7 @@
           <a:p>
             <a:fld id="{6D84748D-454D-46DF-9289-A215CF23A2F8}" type="datetimeFigureOut">
               <a:rPr lang="de-DE" smtClean="0"/>
-              <a:t>28.09.2021</a:t>
+              <a:t>29.10.2021</a:t>
             </a:fld>
             <a:endParaRPr lang="de-DE"/>
           </a:p>
@@ -4571,7 +4571,7 @@
           <a:p>
             <a:fld id="{6D84748D-454D-46DF-9289-A215CF23A2F8}" type="datetimeFigureOut">
               <a:rPr lang="de-DE" smtClean="0"/>
-              <a:t>28.09.2021</a:t>
+              <a:t>29.10.2021</a:t>
             </a:fld>
             <a:endParaRPr lang="de-DE"/>
           </a:p>
@@ -5314,7 +5314,7 @@
           <a:p>
             <a:fld id="{6D84748D-454D-46DF-9289-A215CF23A2F8}" type="datetimeFigureOut">
               <a:rPr lang="de-DE" smtClean="0"/>
-              <a:t>28.09.2021</a:t>
+              <a:t>29.10.2021</a:t>
             </a:fld>
             <a:endParaRPr lang="de-DE"/>
           </a:p>
@@ -6012,7 +6012,7 @@
               <a:t>Notifications</a:t>
             </a:r>
             <a:r>
-              <a:rPr lang="de-DE"/>
+              <a:rPr lang="de-DE" dirty="0"/>
               <a:t> &amp; </a:t>
             </a:r>
             <a:r>
@@ -6020,11 +6020,9 @@
               <a:t>Notification</a:t>
             </a:r>
             <a:r>
-              <a:rPr lang="de-DE" dirty="0"/>
+              <a:rPr lang="de-DE"/>
               <a:t>-Channels</a:t>
             </a:r>
-          </a:p>
-          <a:p>
             <a:endParaRPr lang="de-DE" dirty="0"/>
           </a:p>
         </p:txBody>
@@ -6154,17 +6152,12 @@
           <a:p>
             <a:r>
               <a:rPr lang="de-DE" dirty="0" err="1"/>
-              <a:t>Notification</a:t>
+              <a:t>Notifcations</a:t>
             </a:r>
             <a:r>
               <a:rPr lang="de-DE" dirty="0"/>
-              <a:t> </a:t>
-            </a:r>
-            <a:r>
-              <a:rPr lang="de-DE" dirty="0" err="1"/>
-              <a:t>erwiedern</a:t>
-            </a:r>
-            <a:endParaRPr lang="de-DE" dirty="0"/>
+              <a:t> Progress bar</a:t>
+            </a:r>
           </a:p>
           <a:p>
             <a:r>
@@ -6173,6 +6166,16 @@
             </a:r>
             <a:r>
               <a:rPr lang="de-DE" dirty="0"/>
+              <a:t> erwidern</a:t>
+            </a:r>
+          </a:p>
+          <a:p>
+            <a:r>
+              <a:rPr lang="de-DE" dirty="0" err="1"/>
+              <a:t>Notification</a:t>
+            </a:r>
+            <a:r>
+              <a:rPr lang="de-DE" dirty="0"/>
               <a:t>-Groups</a:t>
             </a:r>
           </a:p>
@@ -6185,21 +6188,6 @@
               <a:rPr lang="de-DE" dirty="0"/>
               <a:t> Stylen</a:t>
             </a:r>
-          </a:p>
-          <a:p>
-            <a:r>
-              <a:rPr lang="de-DE" dirty="0" err="1"/>
-              <a:t>Notifcations</a:t>
-            </a:r>
-            <a:r>
-              <a:rPr lang="de-DE" dirty="0"/>
-              <a:t> </a:t>
-            </a:r>
-            <a:r>
-              <a:rPr lang="de-DE" dirty="0" err="1"/>
-              <a:t>Progressbar</a:t>
-            </a:r>
-            <a:endParaRPr lang="de-DE" dirty="0"/>
           </a:p>
           <a:p>
             <a:r>
@@ -7404,12 +7392,12 @@
           <a:graphicData uri="http://schemas.openxmlformats.org/presentationml/2006/ole">
             <mc:AlternateContent xmlns:mc="http://schemas.openxmlformats.org/markup-compatibility/2006">
               <mc:Choice xmlns:v="urn:schemas-microsoft-com:vml" Requires="v">
-                <p:oleObj name="Document" r:id="rId2" imgW="6579360" imgH="1681920" progId="Word.OpenDocumentText.12">
+                <p:oleObj spid="_x0000_s1032" name="Document" r:id="rId3" imgW="6579360" imgH="1681920" progId="Word.OpenDocumentText.12">
                   <p:embed/>
                 </p:oleObj>
               </mc:Choice>
               <mc:Fallback>
-                <p:oleObj name="Document" r:id="rId2" imgW="6579360" imgH="1681920" progId="Word.OpenDocumentText.12">
+                <p:oleObj name="Document" r:id="rId3" imgW="6579360" imgH="1681920" progId="Word.OpenDocumentText.12">
                   <p:embed/>
                   <p:pic>
                     <p:nvPicPr>
@@ -7418,7 +7406,7 @@
                       <p:nvPr/>
                     </p:nvPicPr>
                     <p:blipFill>
-                      <a:blip r:embed="rId3"/>
+                      <a:blip r:embed="rId4"/>
                       <a:stretch>
                         <a:fillRect/>
                       </a:stretch>
@@ -7976,12 +7964,12 @@
           <a:graphicData uri="http://schemas.openxmlformats.org/presentationml/2006/ole">
             <mc:AlternateContent xmlns:mc="http://schemas.openxmlformats.org/markup-compatibility/2006">
               <mc:Choice xmlns:v="urn:schemas-microsoft-com:vml" Requires="v">
-                <p:oleObj name="Document" r:id="rId2" imgW="6554520" imgH="1005120" progId="Word.OpenDocumentText.12">
+                <p:oleObj spid="_x0000_s2062" name="Document" r:id="rId3" imgW="6554520" imgH="1005120" progId="Word.OpenDocumentText.12">
                   <p:embed/>
                 </p:oleObj>
               </mc:Choice>
               <mc:Fallback>
-                <p:oleObj name="Document" r:id="rId2" imgW="6554520" imgH="1005120" progId="Word.OpenDocumentText.12">
+                <p:oleObj name="Document" r:id="rId3" imgW="6554520" imgH="1005120" progId="Word.OpenDocumentText.12">
                   <p:embed/>
                   <p:pic>
                     <p:nvPicPr>
@@ -7996,7 +7984,7 @@
                       <p:nvPr/>
                     </p:nvPicPr>
                     <p:blipFill>
-                      <a:blip r:embed="rId3"/>
+                      <a:blip r:embed="rId4"/>
                       <a:stretch>
                         <a:fillRect/>
                       </a:stretch>
@@ -8045,12 +8033,12 @@
           <a:graphicData uri="http://schemas.openxmlformats.org/presentationml/2006/ole">
             <mc:AlternateContent xmlns:mc="http://schemas.openxmlformats.org/markup-compatibility/2006">
               <mc:Choice xmlns:v="urn:schemas-microsoft-com:vml" Requires="v">
-                <p:oleObj name="Document" r:id="rId4" imgW="7545240" imgH="1724400" progId="Word.OpenDocumentText.12">
+                <p:oleObj spid="_x0000_s2063" name="Document" r:id="rId5" imgW="7545240" imgH="1724400" progId="Word.OpenDocumentText.12">
                   <p:embed/>
                 </p:oleObj>
               </mc:Choice>
               <mc:Fallback>
-                <p:oleObj name="Document" r:id="rId4" imgW="7545240" imgH="1724400" progId="Word.OpenDocumentText.12">
+                <p:oleObj name="Document" r:id="rId5" imgW="7545240" imgH="1724400" progId="Word.OpenDocumentText.12">
                   <p:embed/>
                   <p:pic>
                     <p:nvPicPr>
@@ -8059,7 +8047,7 @@
                       <p:nvPr/>
                     </p:nvPicPr>
                     <p:blipFill>
-                      <a:blip r:embed="rId5"/>
+                      <a:blip r:embed="rId6"/>
                       <a:stretch>
                         <a:fillRect/>
                       </a:stretch>
@@ -8352,6 +8340,14 @@
               <a:rPr lang="de-DE" dirty="0" err="1"/>
               <a:t>Intents</a:t>
             </a:r>
+            <a:r>
+              <a:rPr lang="de-DE" dirty="0"/>
+              <a:t> und </a:t>
+            </a:r>
+            <a:r>
+              <a:rPr lang="de-DE" dirty="0" err="1"/>
+              <a:t>Pending-Intents</a:t>
+            </a:r>
             <a:endParaRPr lang="de-DE" dirty="0"/>
           </a:p>
         </p:txBody>
@@ -8391,7 +8387,7 @@
           <p:cNvPr id="2" name="Titel 1">
             <a:extLst>
               <a:ext uri="{FF2B5EF4-FFF2-40B4-BE49-F238E27FC236}">
-                <a16:creationId xmlns:a16="http://schemas.microsoft.com/office/drawing/2014/main" id="{8B86E0E8-97A0-4EBC-9146-83745A7230AA}"/>
+                <a16:creationId xmlns:a16="http://schemas.microsoft.com/office/drawing/2014/main" id="{1D9353AB-8AD3-442A-B56D-F47C43D02165}"/>
               </a:ext>
             </a:extLst>
           </p:cNvPr>
@@ -8408,18 +8404,9 @@
           <a:lstStyle/>
           <a:p>
             <a:r>
-              <a:rPr lang="de-DE" dirty="0" err="1"/>
-              <a:t>Notification</a:t>
-            </a:r>
-            <a:r>
               <a:rPr lang="de-DE" dirty="0"/>
-              <a:t> </a:t>
-            </a:r>
-            <a:r>
-              <a:rPr lang="de-DE" dirty="0" err="1"/>
-              <a:t>erwiedern</a:t>
-            </a:r>
-            <a:endParaRPr lang="de-DE" dirty="0"/>
+              <a:t>Progress bar</a:t>
+            </a:r>
           </a:p>
         </p:txBody>
       </p:sp>
@@ -8428,7 +8415,7 @@
           <p:cNvPr id="3" name="Inhaltsplatzhalter 2">
             <a:extLst>
               <a:ext uri="{FF2B5EF4-FFF2-40B4-BE49-F238E27FC236}">
-                <a16:creationId xmlns:a16="http://schemas.microsoft.com/office/drawing/2014/main" id="{1194C7C9-3BFF-45FF-9653-1E5CD13EC12F}"/>
+                <a16:creationId xmlns:a16="http://schemas.microsoft.com/office/drawing/2014/main" id="{13C0610B-D145-486E-B6FB-87D1EE050CF3}"/>
               </a:ext>
             </a:extLst>
           </p:cNvPr>
@@ -8444,20 +8431,521 @@
           <a:bodyPr/>
           <a:lstStyle/>
           <a:p>
-            <a:endParaRPr lang="de-DE"/>
-          </a:p>
-        </p:txBody>
-      </p:sp>
+            <a:r>
+              <a:rPr lang="de-DE" dirty="0"/>
+              <a:t>2 werte</a:t>
+            </a:r>
+          </a:p>
+          <a:p>
+            <a:pPr lvl="1"/>
+            <a:r>
+              <a:rPr lang="de-DE" dirty="0"/>
+              <a:t>PROGRESS_MAX: Maximalwert abhängig vom Anwendungsfall</a:t>
+            </a:r>
+          </a:p>
+          <a:p>
+            <a:pPr lvl="1"/>
+            <a:r>
+              <a:rPr lang="de-DE" dirty="0"/>
+              <a:t>PROGRESS_CURRENT: aktueller stand</a:t>
+            </a:r>
+          </a:p>
+          <a:p>
+            <a:r>
+              <a:rPr lang="de-DE" dirty="0" err="1"/>
+              <a:t>Notification</a:t>
+            </a:r>
+            <a:r>
+              <a:rPr lang="de-DE" dirty="0"/>
+              <a:t> im Hintergrund immer Updaten !</a:t>
+            </a:r>
+          </a:p>
+          <a:p>
+            <a:r>
+              <a:rPr lang="de-DE" dirty="0"/>
+              <a:t>Attribute </a:t>
+            </a:r>
+            <a:r>
+              <a:rPr lang="de-DE" dirty="0" err="1"/>
+              <a:t>setOngoing</a:t>
+            </a:r>
+            <a:r>
+              <a:rPr lang="de-DE" dirty="0"/>
+              <a:t> und </a:t>
+            </a:r>
+            <a:r>
+              <a:rPr lang="de-DE" dirty="0" err="1"/>
+              <a:t>OnlyAlertOnce</a:t>
+            </a:r>
+            <a:r>
+              <a:rPr lang="de-DE" dirty="0"/>
+              <a:t> setzen</a:t>
+            </a:r>
+          </a:p>
+          <a:p>
+            <a:r>
+              <a:rPr lang="de-DE" dirty="0" err="1"/>
+              <a:t>Indeterminate</a:t>
+            </a:r>
+            <a:r>
+              <a:rPr lang="de-DE" dirty="0"/>
+              <a:t> setzen für kontinuierliche Animation</a:t>
+            </a:r>
+          </a:p>
+          <a:p>
+            <a:r>
+              <a:rPr lang="de-DE" dirty="0"/>
+              <a:t>Code: </a:t>
+            </a:r>
+          </a:p>
+          <a:p>
+            <a:endParaRPr lang="de-DE" dirty="0"/>
+          </a:p>
+        </p:txBody>
+      </p:sp>
+      <p:pic>
+        <p:nvPicPr>
+          <p:cNvPr id="5" name="Grafik 4">
+            <a:extLst>
+              <a:ext uri="{FF2B5EF4-FFF2-40B4-BE49-F238E27FC236}">
+                <a16:creationId xmlns:a16="http://schemas.microsoft.com/office/drawing/2014/main" id="{BB06650D-C1B9-421C-BA83-B993D459278E}"/>
+              </a:ext>
+            </a:extLst>
+          </p:cNvPr>
+          <p:cNvPicPr>
+            <a:picLocks noChangeAspect="1"/>
+          </p:cNvPicPr>
+          <p:nvPr/>
+        </p:nvPicPr>
+        <p:blipFill>
+          <a:blip r:embed="rId2"/>
+          <a:stretch>
+            <a:fillRect/>
+          </a:stretch>
+        </p:blipFill>
+        <p:spPr>
+          <a:xfrm>
+            <a:off x="1670312" y="4600201"/>
+            <a:ext cx="7249285" cy="1834156"/>
+          </a:xfrm>
+          <a:prstGeom prst="rect">
+            <a:avLst/>
+          </a:prstGeom>
+        </p:spPr>
+      </p:pic>
     </p:spTree>
     <p:extLst>
       <p:ext uri="{BB962C8B-B14F-4D97-AF65-F5344CB8AC3E}">
-        <p14:creationId xmlns:p14="http://schemas.microsoft.com/office/powerpoint/2010/main" val="2637803397"/>
+        <p14:creationId xmlns:p14="http://schemas.microsoft.com/office/powerpoint/2010/main" val="3794257018"/>
       </p:ext>
     </p:extLst>
   </p:cSld>
   <p:clrMapOvr>
     <a:masterClrMapping/>
   </p:clrMapOvr>
+  <p:timing>
+    <p:tnLst>
+      <p:par>
+        <p:cTn id="1" dur="indefinite" restart="never" nodeType="tmRoot">
+          <p:childTnLst>
+            <p:seq concurrent="1" nextAc="seek">
+              <p:cTn id="2" dur="indefinite" nodeType="mainSeq">
+                <p:childTnLst>
+                  <p:par>
+                    <p:cTn id="3" fill="hold">
+                      <p:stCondLst>
+                        <p:cond delay="indefinite"/>
+                      </p:stCondLst>
+                      <p:childTnLst>
+                        <p:par>
+                          <p:cTn id="4" fill="hold">
+                            <p:stCondLst>
+                              <p:cond delay="0"/>
+                            </p:stCondLst>
+                            <p:childTnLst>
+                              <p:par>
+                                <p:cTn id="5" presetID="1" presetClass="entr" presetSubtype="0" fill="hold" grpId="0" nodeType="clickEffect">
+                                  <p:stCondLst>
+                                    <p:cond delay="0"/>
+                                  </p:stCondLst>
+                                  <p:childTnLst>
+                                    <p:set>
+                                      <p:cBhvr>
+                                        <p:cTn id="6" dur="1" fill="hold">
+                                          <p:stCondLst>
+                                            <p:cond delay="0"/>
+                                          </p:stCondLst>
+                                        </p:cTn>
+                                        <p:tgtEl>
+                                          <p:spTgt spid="3">
+                                            <p:txEl>
+                                              <p:pRg st="0" end="0"/>
+                                            </p:txEl>
+                                          </p:spTgt>
+                                        </p:tgtEl>
+                                        <p:attrNameLst>
+                                          <p:attrName>style.visibility</p:attrName>
+                                        </p:attrNameLst>
+                                      </p:cBhvr>
+                                      <p:to>
+                                        <p:strVal val="visible"/>
+                                      </p:to>
+                                    </p:set>
+                                  </p:childTnLst>
+                                </p:cTn>
+                              </p:par>
+                            </p:childTnLst>
+                          </p:cTn>
+                        </p:par>
+                      </p:childTnLst>
+                    </p:cTn>
+                  </p:par>
+                  <p:par>
+                    <p:cTn id="7" fill="hold">
+                      <p:stCondLst>
+                        <p:cond delay="indefinite"/>
+                      </p:stCondLst>
+                      <p:childTnLst>
+                        <p:par>
+                          <p:cTn id="8" fill="hold">
+                            <p:stCondLst>
+                              <p:cond delay="0"/>
+                            </p:stCondLst>
+                            <p:childTnLst>
+                              <p:par>
+                                <p:cTn id="9" presetID="1" presetClass="entr" presetSubtype="0" fill="hold" grpId="0" nodeType="clickEffect">
+                                  <p:stCondLst>
+                                    <p:cond delay="0"/>
+                                  </p:stCondLst>
+                                  <p:childTnLst>
+                                    <p:set>
+                                      <p:cBhvr>
+                                        <p:cTn id="10" dur="1" fill="hold">
+                                          <p:stCondLst>
+                                            <p:cond delay="0"/>
+                                          </p:stCondLst>
+                                        </p:cTn>
+                                        <p:tgtEl>
+                                          <p:spTgt spid="3">
+                                            <p:txEl>
+                                              <p:pRg st="1" end="1"/>
+                                            </p:txEl>
+                                          </p:spTgt>
+                                        </p:tgtEl>
+                                        <p:attrNameLst>
+                                          <p:attrName>style.visibility</p:attrName>
+                                        </p:attrNameLst>
+                                      </p:cBhvr>
+                                      <p:to>
+                                        <p:strVal val="visible"/>
+                                      </p:to>
+                                    </p:set>
+                                  </p:childTnLst>
+                                </p:cTn>
+                              </p:par>
+                            </p:childTnLst>
+                          </p:cTn>
+                        </p:par>
+                      </p:childTnLst>
+                    </p:cTn>
+                  </p:par>
+                  <p:par>
+                    <p:cTn id="11" fill="hold">
+                      <p:stCondLst>
+                        <p:cond delay="indefinite"/>
+                      </p:stCondLst>
+                      <p:childTnLst>
+                        <p:par>
+                          <p:cTn id="12" fill="hold">
+                            <p:stCondLst>
+                              <p:cond delay="0"/>
+                            </p:stCondLst>
+                            <p:childTnLst>
+                              <p:par>
+                                <p:cTn id="13" presetID="1" presetClass="entr" presetSubtype="0" fill="hold" grpId="0" nodeType="clickEffect">
+                                  <p:stCondLst>
+                                    <p:cond delay="0"/>
+                                  </p:stCondLst>
+                                  <p:childTnLst>
+                                    <p:set>
+                                      <p:cBhvr>
+                                        <p:cTn id="14" dur="1" fill="hold">
+                                          <p:stCondLst>
+                                            <p:cond delay="0"/>
+                                          </p:stCondLst>
+                                        </p:cTn>
+                                        <p:tgtEl>
+                                          <p:spTgt spid="3">
+                                            <p:txEl>
+                                              <p:pRg st="2" end="2"/>
+                                            </p:txEl>
+                                          </p:spTgt>
+                                        </p:tgtEl>
+                                        <p:attrNameLst>
+                                          <p:attrName>style.visibility</p:attrName>
+                                        </p:attrNameLst>
+                                      </p:cBhvr>
+                                      <p:to>
+                                        <p:strVal val="visible"/>
+                                      </p:to>
+                                    </p:set>
+                                  </p:childTnLst>
+                                </p:cTn>
+                              </p:par>
+                            </p:childTnLst>
+                          </p:cTn>
+                        </p:par>
+                      </p:childTnLst>
+                    </p:cTn>
+                  </p:par>
+                  <p:par>
+                    <p:cTn id="15" fill="hold">
+                      <p:stCondLst>
+                        <p:cond delay="indefinite"/>
+                      </p:stCondLst>
+                      <p:childTnLst>
+                        <p:par>
+                          <p:cTn id="16" fill="hold">
+                            <p:stCondLst>
+                              <p:cond delay="0"/>
+                            </p:stCondLst>
+                            <p:childTnLst>
+                              <p:par>
+                                <p:cTn id="17" presetID="1" presetClass="entr" presetSubtype="0" fill="hold" grpId="0" nodeType="clickEffect">
+                                  <p:stCondLst>
+                                    <p:cond delay="0"/>
+                                  </p:stCondLst>
+                                  <p:childTnLst>
+                                    <p:set>
+                                      <p:cBhvr>
+                                        <p:cTn id="18" dur="1" fill="hold">
+                                          <p:stCondLst>
+                                            <p:cond delay="0"/>
+                                          </p:stCondLst>
+                                        </p:cTn>
+                                        <p:tgtEl>
+                                          <p:spTgt spid="3">
+                                            <p:txEl>
+                                              <p:pRg st="3" end="3"/>
+                                            </p:txEl>
+                                          </p:spTgt>
+                                        </p:tgtEl>
+                                        <p:attrNameLst>
+                                          <p:attrName>style.visibility</p:attrName>
+                                        </p:attrNameLst>
+                                      </p:cBhvr>
+                                      <p:to>
+                                        <p:strVal val="visible"/>
+                                      </p:to>
+                                    </p:set>
+                                  </p:childTnLst>
+                                </p:cTn>
+                              </p:par>
+                            </p:childTnLst>
+                          </p:cTn>
+                        </p:par>
+                      </p:childTnLst>
+                    </p:cTn>
+                  </p:par>
+                  <p:par>
+                    <p:cTn id="19" fill="hold">
+                      <p:stCondLst>
+                        <p:cond delay="indefinite"/>
+                      </p:stCondLst>
+                      <p:childTnLst>
+                        <p:par>
+                          <p:cTn id="20" fill="hold">
+                            <p:stCondLst>
+                              <p:cond delay="0"/>
+                            </p:stCondLst>
+                            <p:childTnLst>
+                              <p:par>
+                                <p:cTn id="21" presetID="1" presetClass="entr" presetSubtype="0" fill="hold" grpId="0" nodeType="clickEffect">
+                                  <p:stCondLst>
+                                    <p:cond delay="0"/>
+                                  </p:stCondLst>
+                                  <p:childTnLst>
+                                    <p:set>
+                                      <p:cBhvr>
+                                        <p:cTn id="22" dur="1" fill="hold">
+                                          <p:stCondLst>
+                                            <p:cond delay="0"/>
+                                          </p:stCondLst>
+                                        </p:cTn>
+                                        <p:tgtEl>
+                                          <p:spTgt spid="3">
+                                            <p:txEl>
+                                              <p:pRg st="4" end="4"/>
+                                            </p:txEl>
+                                          </p:spTgt>
+                                        </p:tgtEl>
+                                        <p:attrNameLst>
+                                          <p:attrName>style.visibility</p:attrName>
+                                        </p:attrNameLst>
+                                      </p:cBhvr>
+                                      <p:to>
+                                        <p:strVal val="visible"/>
+                                      </p:to>
+                                    </p:set>
+                                  </p:childTnLst>
+                                </p:cTn>
+                              </p:par>
+                            </p:childTnLst>
+                          </p:cTn>
+                        </p:par>
+                      </p:childTnLst>
+                    </p:cTn>
+                  </p:par>
+                  <p:par>
+                    <p:cTn id="23" fill="hold">
+                      <p:stCondLst>
+                        <p:cond delay="indefinite"/>
+                      </p:stCondLst>
+                      <p:childTnLst>
+                        <p:par>
+                          <p:cTn id="24" fill="hold">
+                            <p:stCondLst>
+                              <p:cond delay="0"/>
+                            </p:stCondLst>
+                            <p:childTnLst>
+                              <p:par>
+                                <p:cTn id="25" presetID="1" presetClass="entr" presetSubtype="0" fill="hold" grpId="0" nodeType="clickEffect">
+                                  <p:stCondLst>
+                                    <p:cond delay="0"/>
+                                  </p:stCondLst>
+                                  <p:childTnLst>
+                                    <p:set>
+                                      <p:cBhvr>
+                                        <p:cTn id="26" dur="1" fill="hold">
+                                          <p:stCondLst>
+                                            <p:cond delay="0"/>
+                                          </p:stCondLst>
+                                        </p:cTn>
+                                        <p:tgtEl>
+                                          <p:spTgt spid="3">
+                                            <p:txEl>
+                                              <p:pRg st="5" end="5"/>
+                                            </p:txEl>
+                                          </p:spTgt>
+                                        </p:tgtEl>
+                                        <p:attrNameLst>
+                                          <p:attrName>style.visibility</p:attrName>
+                                        </p:attrNameLst>
+                                      </p:cBhvr>
+                                      <p:to>
+                                        <p:strVal val="visible"/>
+                                      </p:to>
+                                    </p:set>
+                                  </p:childTnLst>
+                                </p:cTn>
+                              </p:par>
+                            </p:childTnLst>
+                          </p:cTn>
+                        </p:par>
+                      </p:childTnLst>
+                    </p:cTn>
+                  </p:par>
+                  <p:par>
+                    <p:cTn id="27" fill="hold">
+                      <p:stCondLst>
+                        <p:cond delay="indefinite"/>
+                      </p:stCondLst>
+                      <p:childTnLst>
+                        <p:par>
+                          <p:cTn id="28" fill="hold">
+                            <p:stCondLst>
+                              <p:cond delay="0"/>
+                            </p:stCondLst>
+                            <p:childTnLst>
+                              <p:par>
+                                <p:cTn id="29" presetID="1" presetClass="entr" presetSubtype="0" fill="hold" grpId="0" nodeType="clickEffect">
+                                  <p:stCondLst>
+                                    <p:cond delay="0"/>
+                                  </p:stCondLst>
+                                  <p:childTnLst>
+                                    <p:set>
+                                      <p:cBhvr>
+                                        <p:cTn id="30" dur="1" fill="hold">
+                                          <p:stCondLst>
+                                            <p:cond delay="0"/>
+                                          </p:stCondLst>
+                                        </p:cTn>
+                                        <p:tgtEl>
+                                          <p:spTgt spid="3">
+                                            <p:txEl>
+                                              <p:pRg st="6" end="6"/>
+                                            </p:txEl>
+                                          </p:spTgt>
+                                        </p:tgtEl>
+                                        <p:attrNameLst>
+                                          <p:attrName>style.visibility</p:attrName>
+                                        </p:attrNameLst>
+                                      </p:cBhvr>
+                                      <p:to>
+                                        <p:strVal val="visible"/>
+                                      </p:to>
+                                    </p:set>
+                                  </p:childTnLst>
+                                </p:cTn>
+                              </p:par>
+                              <p:par>
+                                <p:cTn id="31" presetID="1" presetClass="entr" presetSubtype="0" fill="hold" nodeType="withEffect">
+                                  <p:stCondLst>
+                                    <p:cond delay="0"/>
+                                  </p:stCondLst>
+                                  <p:childTnLst>
+                                    <p:set>
+                                      <p:cBhvr>
+                                        <p:cTn id="32" dur="1" fill="hold">
+                                          <p:stCondLst>
+                                            <p:cond delay="0"/>
+                                          </p:stCondLst>
+                                        </p:cTn>
+                                        <p:tgtEl>
+                                          <p:spTgt spid="5"/>
+                                        </p:tgtEl>
+                                        <p:attrNameLst>
+                                          <p:attrName>style.visibility</p:attrName>
+                                        </p:attrNameLst>
+                                      </p:cBhvr>
+                                      <p:to>
+                                        <p:strVal val="visible"/>
+                                      </p:to>
+                                    </p:set>
+                                  </p:childTnLst>
+                                </p:cTn>
+                              </p:par>
+                            </p:childTnLst>
+                          </p:cTn>
+                        </p:par>
+                      </p:childTnLst>
+                    </p:cTn>
+                  </p:par>
+                </p:childTnLst>
+              </p:cTn>
+              <p:prevCondLst>
+                <p:cond evt="onPrev" delay="0">
+                  <p:tgtEl>
+                    <p:sldTgt/>
+                  </p:tgtEl>
+                </p:cond>
+              </p:prevCondLst>
+              <p:nextCondLst>
+                <p:cond evt="onNext" delay="0">
+                  <p:tgtEl>
+                    <p:sldTgt/>
+                  </p:tgtEl>
+                </p:cond>
+              </p:nextCondLst>
+            </p:seq>
+          </p:childTnLst>
+        </p:cTn>
+      </p:par>
+    </p:tnLst>
+    <p:bldLst>
+      <p:bldP spid="3" grpId="0" uiExpand="1" build="p"/>
+    </p:bldLst>
+  </p:timing>
 </p:sld>
 </file>
 
@@ -8483,7 +8971,7 @@
           <p:cNvPr id="2" name="Titel 1">
             <a:extLst>
               <a:ext uri="{FF2B5EF4-FFF2-40B4-BE49-F238E27FC236}">
-                <a16:creationId xmlns:a16="http://schemas.microsoft.com/office/drawing/2014/main" id="{097F7868-3AB0-4729-A9A7-624F1715B266}"/>
+                <a16:creationId xmlns:a16="http://schemas.microsoft.com/office/drawing/2014/main" id="{8B86E0E8-97A0-4EBC-9146-83745A7230AA}"/>
               </a:ext>
             </a:extLst>
           </p:cNvPr>
@@ -8505,8 +8993,13 @@
             </a:r>
             <a:r>
               <a:rPr lang="de-DE" dirty="0"/>
-              <a:t> Groups</a:t>
-            </a:r>
+              <a:t> </a:t>
+            </a:r>
+            <a:r>
+              <a:rPr lang="de-DE" dirty="0" err="1"/>
+              <a:t>erwiedern</a:t>
+            </a:r>
+            <a:endParaRPr lang="de-DE" dirty="0"/>
           </a:p>
         </p:txBody>
       </p:sp>
@@ -8515,7 +9008,7 @@
           <p:cNvPr id="3" name="Inhaltsplatzhalter 2">
             <a:extLst>
               <a:ext uri="{FF2B5EF4-FFF2-40B4-BE49-F238E27FC236}">
-                <a16:creationId xmlns:a16="http://schemas.microsoft.com/office/drawing/2014/main" id="{8951AE06-BFB2-45B9-BFFC-E55766B5BC14}"/>
+                <a16:creationId xmlns:a16="http://schemas.microsoft.com/office/drawing/2014/main" id="{1194C7C9-3BFF-45FF-9653-1E5CD13EC12F}"/>
               </a:ext>
             </a:extLst>
           </p:cNvPr>
@@ -8538,7 +9031,7 @@
     </p:spTree>
     <p:extLst>
       <p:ext uri="{BB962C8B-B14F-4D97-AF65-F5344CB8AC3E}">
-        <p14:creationId xmlns:p14="http://schemas.microsoft.com/office/powerpoint/2010/main" val="3779608445"/>
+        <p14:creationId xmlns:p14="http://schemas.microsoft.com/office/powerpoint/2010/main" val="2637803397"/>
       </p:ext>
     </p:extLst>
   </p:cSld>
@@ -8570,7 +9063,7 @@
           <p:cNvPr id="2" name="Titel 1">
             <a:extLst>
               <a:ext uri="{FF2B5EF4-FFF2-40B4-BE49-F238E27FC236}">
-                <a16:creationId xmlns:a16="http://schemas.microsoft.com/office/drawing/2014/main" id="{1D9353AB-8AD3-442A-B56D-F47C43D02165}"/>
+                <a16:creationId xmlns:a16="http://schemas.microsoft.com/office/drawing/2014/main" id="{097F7868-3AB0-4729-A9A7-624F1715B266}"/>
               </a:ext>
             </a:extLst>
           </p:cNvPr>
@@ -8588,9 +9081,12 @@
           <a:p>
             <a:r>
               <a:rPr lang="de-DE" dirty="0" err="1"/>
-              <a:t>Progressbar</a:t>
-            </a:r>
-            <a:endParaRPr lang="de-DE" dirty="0"/>
+              <a:t>Notification</a:t>
+            </a:r>
+            <a:r>
+              <a:rPr lang="de-DE" dirty="0"/>
+              <a:t> Groups</a:t>
+            </a:r>
           </a:p>
         </p:txBody>
       </p:sp>
@@ -8599,7 +9095,7 @@
           <p:cNvPr id="3" name="Inhaltsplatzhalter 2">
             <a:extLst>
               <a:ext uri="{FF2B5EF4-FFF2-40B4-BE49-F238E27FC236}">
-                <a16:creationId xmlns:a16="http://schemas.microsoft.com/office/drawing/2014/main" id="{13C0610B-D145-486E-B6FB-87D1EE050CF3}"/>
+                <a16:creationId xmlns:a16="http://schemas.microsoft.com/office/drawing/2014/main" id="{8951AE06-BFB2-45B9-BFFC-E55766B5BC14}"/>
               </a:ext>
             </a:extLst>
           </p:cNvPr>
@@ -8622,7 +9118,7 @@
     </p:spTree>
     <p:extLst>
       <p:ext uri="{BB962C8B-B14F-4D97-AF65-F5344CB8AC3E}">
-        <p14:creationId xmlns:p14="http://schemas.microsoft.com/office/powerpoint/2010/main" val="3794257018"/>
+        <p14:creationId xmlns:p14="http://schemas.microsoft.com/office/powerpoint/2010/main" val="3779608445"/>
       </p:ext>
     </p:extLst>
   </p:cSld>

</xml_diff>

<commit_message>
Big-Picture Style Notification implementieren
Aussehen minimal verändert(launcherIcon), Präsentation weiter erstellt.
</commit_message>
<xml_diff>
--- a/Dokumentation/Präsentation/Push-Notifications.pptx
+++ b/Dokumentation/Präsentation/Push-Notifications.pptx
@@ -13,8 +13,11 @@
     <p:sldId id="262" r:id="rId7"/>
     <p:sldId id="265" r:id="rId8"/>
     <p:sldId id="263" r:id="rId9"/>
-    <p:sldId id="264" r:id="rId10"/>
-    <p:sldId id="257" r:id="rId11"/>
+    <p:sldId id="266" r:id="rId10"/>
+    <p:sldId id="267" r:id="rId11"/>
+    <p:sldId id="268" r:id="rId12"/>
+    <p:sldId id="264" r:id="rId13"/>
+    <p:sldId id="257" r:id="rId14"/>
   </p:sldIdLst>
   <p:sldSz cx="12192000" cy="6858000"/>
   <p:notesSz cx="6858000" cy="9144000"/>
@@ -843,7 +846,7 @@
           <a:p>
             <a:fld id="{6D84748D-454D-46DF-9289-A215CF23A2F8}" type="datetimeFigureOut">
               <a:rPr lang="de-DE" smtClean="0"/>
-              <a:t>29.10.2021</a:t>
+              <a:t>01.11.2021</a:t>
             </a:fld>
             <a:endParaRPr lang="de-DE"/>
           </a:p>
@@ -1094,7 +1097,7 @@
           <a:p>
             <a:fld id="{6D84748D-454D-46DF-9289-A215CF23A2F8}" type="datetimeFigureOut">
               <a:rPr lang="de-DE" smtClean="0"/>
-              <a:t>29.10.2021</a:t>
+              <a:t>01.11.2021</a:t>
             </a:fld>
             <a:endParaRPr lang="de-DE"/>
           </a:p>
@@ -1408,7 +1411,7 @@
           <a:p>
             <a:fld id="{6D84748D-454D-46DF-9289-A215CF23A2F8}" type="datetimeFigureOut">
               <a:rPr lang="de-DE" smtClean="0"/>
-              <a:t>29.10.2021</a:t>
+              <a:t>01.11.2021</a:t>
             </a:fld>
             <a:endParaRPr lang="de-DE"/>
           </a:p>
@@ -1749,7 +1752,7 @@
           <a:p>
             <a:fld id="{6D84748D-454D-46DF-9289-A215CF23A2F8}" type="datetimeFigureOut">
               <a:rPr lang="de-DE" smtClean="0"/>
-              <a:t>29.10.2021</a:t>
+              <a:t>01.11.2021</a:t>
             </a:fld>
             <a:endParaRPr lang="de-DE"/>
           </a:p>
@@ -2063,7 +2066,7 @@
           <a:p>
             <a:fld id="{6D84748D-454D-46DF-9289-A215CF23A2F8}" type="datetimeFigureOut">
               <a:rPr lang="de-DE" smtClean="0"/>
-              <a:t>29.10.2021</a:t>
+              <a:t>01.11.2021</a:t>
             </a:fld>
             <a:endParaRPr lang="de-DE"/>
           </a:p>
@@ -2456,7 +2459,7 @@
           <a:p>
             <a:fld id="{6D84748D-454D-46DF-9289-A215CF23A2F8}" type="datetimeFigureOut">
               <a:rPr lang="de-DE" smtClean="0"/>
-              <a:t>29.10.2021</a:t>
+              <a:t>01.11.2021</a:t>
             </a:fld>
             <a:endParaRPr lang="de-DE"/>
           </a:p>
@@ -2626,7 +2629,7 @@
           <a:p>
             <a:fld id="{6D84748D-454D-46DF-9289-A215CF23A2F8}" type="datetimeFigureOut">
               <a:rPr lang="de-DE" smtClean="0"/>
-              <a:t>29.10.2021</a:t>
+              <a:t>01.11.2021</a:t>
             </a:fld>
             <a:endParaRPr lang="de-DE"/>
           </a:p>
@@ -2806,7 +2809,7 @@
           <a:p>
             <a:fld id="{6D84748D-454D-46DF-9289-A215CF23A2F8}" type="datetimeFigureOut">
               <a:rPr lang="de-DE" smtClean="0"/>
-              <a:t>29.10.2021</a:t>
+              <a:t>01.11.2021</a:t>
             </a:fld>
             <a:endParaRPr lang="de-DE"/>
           </a:p>
@@ -2982,7 +2985,7 @@
           <a:p>
             <a:fld id="{6D84748D-454D-46DF-9289-A215CF23A2F8}" type="datetimeFigureOut">
               <a:rPr lang="de-DE" smtClean="0"/>
-              <a:t>29.10.2021</a:t>
+              <a:t>01.11.2021</a:t>
             </a:fld>
             <a:endParaRPr lang="de-DE"/>
           </a:p>
@@ -3229,7 +3232,7 @@
           <a:p>
             <a:fld id="{6D84748D-454D-46DF-9289-A215CF23A2F8}" type="datetimeFigureOut">
               <a:rPr lang="de-DE" smtClean="0"/>
-              <a:t>29.10.2021</a:t>
+              <a:t>01.11.2021</a:t>
             </a:fld>
             <a:endParaRPr lang="de-DE"/>
           </a:p>
@@ -3461,7 +3464,7 @@
           <a:p>
             <a:fld id="{6D84748D-454D-46DF-9289-A215CF23A2F8}" type="datetimeFigureOut">
               <a:rPr lang="de-DE" smtClean="0"/>
-              <a:t>29.10.2021</a:t>
+              <a:t>01.11.2021</a:t>
             </a:fld>
             <a:endParaRPr lang="de-DE"/>
           </a:p>
@@ -3835,7 +3838,7 @@
           <a:p>
             <a:fld id="{6D84748D-454D-46DF-9289-A215CF23A2F8}" type="datetimeFigureOut">
               <a:rPr lang="de-DE" smtClean="0"/>
-              <a:t>29.10.2021</a:t>
+              <a:t>01.11.2021</a:t>
             </a:fld>
             <a:endParaRPr lang="de-DE"/>
           </a:p>
@@ -3958,7 +3961,7 @@
           <a:p>
             <a:fld id="{6D84748D-454D-46DF-9289-A215CF23A2F8}" type="datetimeFigureOut">
               <a:rPr lang="de-DE" smtClean="0"/>
-              <a:t>29.10.2021</a:t>
+              <a:t>01.11.2021</a:t>
             </a:fld>
             <a:endParaRPr lang="de-DE"/>
           </a:p>
@@ -4053,7 +4056,7 @@
           <a:p>
             <a:fld id="{6D84748D-454D-46DF-9289-A215CF23A2F8}" type="datetimeFigureOut">
               <a:rPr lang="de-DE" smtClean="0"/>
-              <a:t>29.10.2021</a:t>
+              <a:t>01.11.2021</a:t>
             </a:fld>
             <a:endParaRPr lang="de-DE"/>
           </a:p>
@@ -4308,7 +4311,7 @@
           <a:p>
             <a:fld id="{6D84748D-454D-46DF-9289-A215CF23A2F8}" type="datetimeFigureOut">
               <a:rPr lang="de-DE" smtClean="0"/>
-              <a:t>29.10.2021</a:t>
+              <a:t>01.11.2021</a:t>
             </a:fld>
             <a:endParaRPr lang="de-DE"/>
           </a:p>
@@ -4571,7 +4574,7 @@
           <a:p>
             <a:fld id="{6D84748D-454D-46DF-9289-A215CF23A2F8}" type="datetimeFigureOut">
               <a:rPr lang="de-DE" smtClean="0"/>
-              <a:t>29.10.2021</a:t>
+              <a:t>01.11.2021</a:t>
             </a:fld>
             <a:endParaRPr lang="de-DE"/>
           </a:p>
@@ -5314,7 +5317,7 @@
           <a:p>
             <a:fld id="{6D84748D-454D-46DF-9289-A215CF23A2F8}" type="datetimeFigureOut">
               <a:rPr lang="de-DE" smtClean="0"/>
-              <a:t>29.10.2021</a:t>
+              <a:t>01.11.2021</a:t>
             </a:fld>
             <a:endParaRPr lang="de-DE"/>
           </a:p>
@@ -5934,6 +5937,264 @@
           <p:cNvPr id="2" name="Titel 1">
             <a:extLst>
               <a:ext uri="{FF2B5EF4-FFF2-40B4-BE49-F238E27FC236}">
+                <a16:creationId xmlns:a16="http://schemas.microsoft.com/office/drawing/2014/main" id="{3CBFE7A8-2DC7-44F0-8899-D08147821CD3}"/>
+              </a:ext>
+            </a:extLst>
+          </p:cNvPr>
+          <p:cNvSpPr>
+            <a:spLocks noGrp="1"/>
+          </p:cNvSpPr>
+          <p:nvPr>
+            <p:ph type="title"/>
+          </p:nvPr>
+        </p:nvSpPr>
+        <p:spPr/>
+        <p:txBody>
+          <a:bodyPr/>
+          <a:lstStyle/>
+          <a:p>
+            <a:r>
+              <a:rPr lang="de-DE" dirty="0"/>
+              <a:t>Big-Picture</a:t>
+            </a:r>
+          </a:p>
+        </p:txBody>
+      </p:sp>
+      <p:sp>
+        <p:nvSpPr>
+          <p:cNvPr id="3" name="Inhaltsplatzhalter 2">
+            <a:extLst>
+              <a:ext uri="{FF2B5EF4-FFF2-40B4-BE49-F238E27FC236}">
+                <a16:creationId xmlns:a16="http://schemas.microsoft.com/office/drawing/2014/main" id="{793D7C22-5E15-4D4F-98DE-167CD7A187A7}"/>
+              </a:ext>
+            </a:extLst>
+          </p:cNvPr>
+          <p:cNvSpPr>
+            <a:spLocks noGrp="1"/>
+          </p:cNvSpPr>
+          <p:nvPr>
+            <p:ph idx="1"/>
+          </p:nvPr>
+        </p:nvSpPr>
+        <p:spPr/>
+        <p:txBody>
+          <a:bodyPr/>
+          <a:lstStyle/>
+          <a:p>
+            <a:endParaRPr lang="de-DE"/>
+          </a:p>
+        </p:txBody>
+      </p:sp>
+    </p:spTree>
+    <p:extLst>
+      <p:ext uri="{BB962C8B-B14F-4D97-AF65-F5344CB8AC3E}">
+        <p14:creationId xmlns:p14="http://schemas.microsoft.com/office/powerpoint/2010/main" val="3000958695"/>
+      </p:ext>
+    </p:extLst>
+  </p:cSld>
+  <p:clrMapOvr>
+    <a:masterClrMapping/>
+  </p:clrMapOvr>
+</p:sld>
+</file>
+
+<file path=ppt/slides/slide11.xml><?xml version="1.0" encoding="utf-8"?>
+<p:sld xmlns:a="http://schemas.openxmlformats.org/drawingml/2006/main" xmlns:r="http://schemas.openxmlformats.org/officeDocument/2006/relationships" xmlns:p="http://schemas.openxmlformats.org/presentationml/2006/main">
+  <p:cSld>
+    <p:spTree>
+      <p:nvGrpSpPr>
+        <p:cNvPr id="1" name=""/>
+        <p:cNvGrpSpPr/>
+        <p:nvPr/>
+      </p:nvGrpSpPr>
+      <p:grpSpPr>
+        <a:xfrm>
+          <a:off x="0" y="0"/>
+          <a:ext cx="0" cy="0"/>
+          <a:chOff x="0" y="0"/>
+          <a:chExt cx="0" cy="0"/>
+        </a:xfrm>
+      </p:grpSpPr>
+      <p:sp>
+        <p:nvSpPr>
+          <p:cNvPr id="2" name="Titel 1">
+            <a:extLst>
+              <a:ext uri="{FF2B5EF4-FFF2-40B4-BE49-F238E27FC236}">
+                <a16:creationId xmlns:a16="http://schemas.microsoft.com/office/drawing/2014/main" id="{4AD8E516-75DB-401B-AEDB-E09F088A3BFA}"/>
+              </a:ext>
+            </a:extLst>
+          </p:cNvPr>
+          <p:cNvSpPr>
+            <a:spLocks noGrp="1"/>
+          </p:cNvSpPr>
+          <p:nvPr>
+            <p:ph type="title"/>
+          </p:nvPr>
+        </p:nvSpPr>
+        <p:spPr/>
+        <p:txBody>
+          <a:bodyPr/>
+          <a:lstStyle/>
+          <a:p>
+            <a:r>
+              <a:rPr lang="de-DE" dirty="0"/>
+              <a:t>Media-</a:t>
+            </a:r>
+            <a:r>
+              <a:rPr lang="de-DE" dirty="0" err="1"/>
+              <a:t>Controlls</a:t>
+            </a:r>
+            <a:endParaRPr lang="de-DE" dirty="0"/>
+          </a:p>
+        </p:txBody>
+      </p:sp>
+      <p:sp>
+        <p:nvSpPr>
+          <p:cNvPr id="3" name="Inhaltsplatzhalter 2">
+            <a:extLst>
+              <a:ext uri="{FF2B5EF4-FFF2-40B4-BE49-F238E27FC236}">
+                <a16:creationId xmlns:a16="http://schemas.microsoft.com/office/drawing/2014/main" id="{36B0214F-1065-4BFE-8D6B-74AA57F72348}"/>
+              </a:ext>
+            </a:extLst>
+          </p:cNvPr>
+          <p:cNvSpPr>
+            <a:spLocks noGrp="1"/>
+          </p:cNvSpPr>
+          <p:nvPr>
+            <p:ph idx="1"/>
+          </p:nvPr>
+        </p:nvSpPr>
+        <p:spPr/>
+        <p:txBody>
+          <a:bodyPr/>
+          <a:lstStyle/>
+          <a:p>
+            <a:endParaRPr lang="de-DE"/>
+          </a:p>
+        </p:txBody>
+      </p:sp>
+    </p:spTree>
+    <p:extLst>
+      <p:ext uri="{BB962C8B-B14F-4D97-AF65-F5344CB8AC3E}">
+        <p14:creationId xmlns:p14="http://schemas.microsoft.com/office/powerpoint/2010/main" val="9131880"/>
+      </p:ext>
+    </p:extLst>
+  </p:cSld>
+  <p:clrMapOvr>
+    <a:masterClrMapping/>
+  </p:clrMapOvr>
+</p:sld>
+</file>
+
+<file path=ppt/slides/slide12.xml><?xml version="1.0" encoding="utf-8"?>
+<p:sld xmlns:a="http://schemas.openxmlformats.org/drawingml/2006/main" xmlns:r="http://schemas.openxmlformats.org/officeDocument/2006/relationships" xmlns:p="http://schemas.openxmlformats.org/presentationml/2006/main">
+  <p:cSld>
+    <p:spTree>
+      <p:nvGrpSpPr>
+        <p:cNvPr id="1" name=""/>
+        <p:cNvGrpSpPr/>
+        <p:nvPr/>
+      </p:nvGrpSpPr>
+      <p:grpSpPr>
+        <a:xfrm>
+          <a:off x="0" y="0"/>
+          <a:ext cx="0" cy="0"/>
+          <a:chOff x="0" y="0"/>
+          <a:chExt cx="0" cy="0"/>
+        </a:xfrm>
+      </p:grpSpPr>
+      <p:sp>
+        <p:nvSpPr>
+          <p:cNvPr id="2" name="Titel 1">
+            <a:extLst>
+              <a:ext uri="{FF2B5EF4-FFF2-40B4-BE49-F238E27FC236}">
+                <a16:creationId xmlns:a16="http://schemas.microsoft.com/office/drawing/2014/main" id="{097F7868-3AB0-4729-A9A7-624F1715B266}"/>
+              </a:ext>
+            </a:extLst>
+          </p:cNvPr>
+          <p:cNvSpPr>
+            <a:spLocks noGrp="1"/>
+          </p:cNvSpPr>
+          <p:nvPr>
+            <p:ph type="title"/>
+          </p:nvPr>
+        </p:nvSpPr>
+        <p:spPr/>
+        <p:txBody>
+          <a:bodyPr/>
+          <a:lstStyle/>
+          <a:p>
+            <a:r>
+              <a:rPr lang="de-DE" dirty="0" err="1"/>
+              <a:t>Notification</a:t>
+            </a:r>
+            <a:r>
+              <a:rPr lang="de-DE" dirty="0"/>
+              <a:t> Groups</a:t>
+            </a:r>
+          </a:p>
+        </p:txBody>
+      </p:sp>
+      <p:sp>
+        <p:nvSpPr>
+          <p:cNvPr id="3" name="Inhaltsplatzhalter 2">
+            <a:extLst>
+              <a:ext uri="{FF2B5EF4-FFF2-40B4-BE49-F238E27FC236}">
+                <a16:creationId xmlns:a16="http://schemas.microsoft.com/office/drawing/2014/main" id="{8951AE06-BFB2-45B9-BFFC-E55766B5BC14}"/>
+              </a:ext>
+            </a:extLst>
+          </p:cNvPr>
+          <p:cNvSpPr>
+            <a:spLocks noGrp="1"/>
+          </p:cNvSpPr>
+          <p:nvPr>
+            <p:ph idx="1"/>
+          </p:nvPr>
+        </p:nvSpPr>
+        <p:spPr/>
+        <p:txBody>
+          <a:bodyPr/>
+          <a:lstStyle/>
+          <a:p>
+            <a:endParaRPr lang="de-DE"/>
+          </a:p>
+        </p:txBody>
+      </p:sp>
+    </p:spTree>
+    <p:extLst>
+      <p:ext uri="{BB962C8B-B14F-4D97-AF65-F5344CB8AC3E}">
+        <p14:creationId xmlns:p14="http://schemas.microsoft.com/office/powerpoint/2010/main" val="3779608445"/>
+      </p:ext>
+    </p:extLst>
+  </p:cSld>
+  <p:clrMapOvr>
+    <a:masterClrMapping/>
+  </p:clrMapOvr>
+</p:sld>
+</file>
+
+<file path=ppt/slides/slide13.xml><?xml version="1.0" encoding="utf-8"?>
+<p:sld xmlns:a="http://schemas.openxmlformats.org/drawingml/2006/main" xmlns:r="http://schemas.openxmlformats.org/officeDocument/2006/relationships" xmlns:p="http://schemas.openxmlformats.org/presentationml/2006/main">
+  <p:cSld>
+    <p:spTree>
+      <p:nvGrpSpPr>
+        <p:cNvPr id="1" name=""/>
+        <p:cNvGrpSpPr/>
+        <p:nvPr/>
+      </p:nvGrpSpPr>
+      <p:grpSpPr>
+        <a:xfrm>
+          <a:off x="0" y="0"/>
+          <a:ext cx="0" cy="0"/>
+          <a:chOff x="0" y="0"/>
+          <a:chExt cx="0" cy="0"/>
+        </a:xfrm>
+      </p:grpSpPr>
+      <p:sp>
+        <p:nvSpPr>
+          <p:cNvPr id="2" name="Titel 1">
+            <a:extLst>
+              <a:ext uri="{FF2B5EF4-FFF2-40B4-BE49-F238E27FC236}">
                 <a16:creationId xmlns:a16="http://schemas.microsoft.com/office/drawing/2014/main" id="{4102E217-23C5-498F-BD47-DF000EB2B0E6}"/>
               </a:ext>
             </a:extLst>
@@ -6103,7 +6364,9 @@
         </p:nvSpPr>
         <p:spPr/>
         <p:txBody>
-          <a:bodyPr/>
+          <a:bodyPr>
+            <a:normAutofit fontScale="92500" lnSpcReduction="10000"/>
+          </a:bodyPr>
           <a:lstStyle/>
           <a:p>
             <a:r>
@@ -6140,6 +6403,7 @@
             </a:r>
           </a:p>
           <a:p>
+            <a:pPr lvl="1"/>
             <a:r>
               <a:rPr lang="de-DE" dirty="0" err="1"/>
               <a:t>Notifications</a:t>
@@ -6166,7 +6430,7 @@
             </a:r>
             <a:r>
               <a:rPr lang="de-DE" dirty="0"/>
-              <a:t> erwidern</a:t>
+              <a:t> erwidern &amp; Messaging Style</a:t>
             </a:r>
           </a:p>
           <a:p>
@@ -6187,6 +6451,32 @@
             <a:r>
               <a:rPr lang="de-DE" dirty="0"/>
               <a:t> Stylen</a:t>
+            </a:r>
+          </a:p>
+          <a:p>
+            <a:pPr lvl="1"/>
+            <a:r>
+              <a:rPr lang="de-DE" dirty="0"/>
+              <a:t>Big-Picture</a:t>
+            </a:r>
+          </a:p>
+          <a:p>
+            <a:pPr lvl="1"/>
+            <a:r>
+              <a:rPr lang="de-DE" dirty="0" err="1"/>
+              <a:t>Mediacontrolls</a:t>
+            </a:r>
+            <a:r>
+              <a:rPr lang="de-DE" dirty="0"/>
+              <a:t> </a:t>
+            </a:r>
+            <a:r>
+              <a:rPr lang="de-DE" dirty="0" err="1"/>
+              <a:t>uvm</a:t>
+            </a:r>
+            <a:r>
+              <a:rPr lang="de-DE" dirty="0"/>
+              <a:t>.</a:t>
             </a:r>
           </a:p>
           <a:p>
@@ -6656,6 +6946,104 @@
                       </p:childTnLst>
                     </p:cTn>
                   </p:par>
+                  <p:par>
+                    <p:cTn id="39" fill="hold">
+                      <p:stCondLst>
+                        <p:cond delay="indefinite"/>
+                      </p:stCondLst>
+                      <p:childTnLst>
+                        <p:par>
+                          <p:cTn id="40" fill="hold">
+                            <p:stCondLst>
+                              <p:cond delay="0"/>
+                            </p:stCondLst>
+                            <p:childTnLst>
+                              <p:par>
+                                <p:cTn id="41" presetID="1" presetClass="entr" presetSubtype="0" fill="hold" grpId="0" nodeType="clickEffect">
+                                  <p:stCondLst>
+                                    <p:cond delay="0"/>
+                                  </p:stCondLst>
+                                  <p:childTnLst>
+                                    <p:set>
+                                      <p:cBhvr>
+                                        <p:cTn id="42" dur="1" fill="hold">
+                                          <p:stCondLst>
+                                            <p:cond delay="0"/>
+                                          </p:stCondLst>
+                                        </p:cTn>
+                                        <p:tgtEl>
+                                          <p:spTgt spid="3">
+                                            <p:txEl>
+                                              <p:pRg st="9" end="9"/>
+                                            </p:txEl>
+                                          </p:spTgt>
+                                        </p:tgtEl>
+                                        <p:attrNameLst>
+                                          <p:attrName>style.visibility</p:attrName>
+                                        </p:attrNameLst>
+                                      </p:cBhvr>
+                                      <p:to>
+                                        <p:strVal val="visible"/>
+                                      </p:to>
+                                    </p:set>
+                                  </p:childTnLst>
+                                </p:cTn>
+                              </p:par>
+                            </p:childTnLst>
+                          </p:cTn>
+                        </p:par>
+                      </p:childTnLst>
+                    </p:cTn>
+                  </p:par>
+                  <p:par>
+                    <p:cTn id="43" fill="hold">
+                      <p:stCondLst>
+                        <p:cond delay="indefinite"/>
+                      </p:stCondLst>
+                      <p:childTnLst>
+                        <p:par>
+                          <p:cTn id="44" fill="hold">
+                            <p:stCondLst>
+                              <p:cond delay="0"/>
+                            </p:stCondLst>
+                            <p:childTnLst>
+                              <p:par>
+                                <p:cTn id="45" presetID="1" presetClass="entr" presetSubtype="0" fill="hold" grpId="0" nodeType="clickEffect">
+                                  <p:stCondLst>
+                                    <p:cond delay="0"/>
+                                  </p:stCondLst>
+                                  <p:childTnLst>
+                                    <p:set>
+                                      <p:cBhvr>
+                                        <p:cTn id="46" dur="1" fill="hold">
+                                          <p:stCondLst>
+                                            <p:cond delay="0"/>
+                                          </p:stCondLst>
+                                        </p:cTn>
+                                        <p:tgtEl>
+                                          <p:spTgt spid="3">
+                                            <p:txEl>
+                                              <p:pRg st="10" end="10"/>
+                                            </p:txEl>
+                                          </p:spTgt>
+                                        </p:tgtEl>
+                                        <p:attrNameLst>
+                                          <p:attrName>style.visibility</p:attrName>
+                                        </p:attrNameLst>
+                                      </p:cBhvr>
+                                      <p:to>
+                                        <p:strVal val="visible"/>
+                                      </p:to>
+                                    </p:set>
+                                  </p:childTnLst>
+                                </p:cTn>
+                              </p:par>
+                            </p:childTnLst>
+                          </p:cTn>
+                        </p:par>
+                      </p:childTnLst>
+                    </p:cTn>
+                  </p:par>
                 </p:childTnLst>
               </p:cTn>
               <p:prevCondLst>
@@ -7392,7 +7780,7 @@
           <a:graphicData uri="http://schemas.openxmlformats.org/presentationml/2006/ole">
             <mc:AlternateContent xmlns:mc="http://schemas.openxmlformats.org/markup-compatibility/2006">
               <mc:Choice xmlns:v="urn:schemas-microsoft-com:vml" Requires="v">
-                <p:oleObj spid="_x0000_s1032" name="Document" r:id="rId3" imgW="6579360" imgH="1681920" progId="Word.OpenDocumentText.12">
+                <p:oleObj spid="_x0000_s1038" name="Document" r:id="rId3" imgW="6579360" imgH="1681920" progId="Word.OpenDocumentText.12">
                   <p:embed/>
                 </p:oleObj>
               </mc:Choice>
@@ -7964,7 +8352,7 @@
           <a:graphicData uri="http://schemas.openxmlformats.org/presentationml/2006/ole">
             <mc:AlternateContent xmlns:mc="http://schemas.openxmlformats.org/markup-compatibility/2006">
               <mc:Choice xmlns:v="urn:schemas-microsoft-com:vml" Requires="v">
-                <p:oleObj spid="_x0000_s2062" name="Document" r:id="rId3" imgW="6554520" imgH="1005120" progId="Word.OpenDocumentText.12">
+                <p:oleObj spid="_x0000_s2074" name="Document" r:id="rId3" imgW="6554520" imgH="1005120" progId="Word.OpenDocumentText.12">
                   <p:embed/>
                 </p:oleObj>
               </mc:Choice>
@@ -8033,7 +8421,7 @@
           <a:graphicData uri="http://schemas.openxmlformats.org/presentationml/2006/ole">
             <mc:AlternateContent xmlns:mc="http://schemas.openxmlformats.org/markup-compatibility/2006">
               <mc:Choice xmlns:v="urn:schemas-microsoft-com:vml" Requires="v">
-                <p:oleObj spid="_x0000_s2063" name="Document" r:id="rId5" imgW="7545240" imgH="1724400" progId="Word.OpenDocumentText.12">
+                <p:oleObj spid="_x0000_s2075" name="Document" r:id="rId5" imgW="7545240" imgH="1724400" progId="Word.OpenDocumentText.12">
                   <p:embed/>
                 </p:oleObj>
               </mc:Choice>
@@ -8349,6 +8737,28 @@
               <a:t>Pending-Intents</a:t>
             </a:r>
             <a:endParaRPr lang="de-DE" dirty="0"/>
+          </a:p>
+          <a:p>
+            <a:r>
+              <a:rPr lang="de-DE" dirty="0"/>
+              <a:t>Beachten!! -&gt; </a:t>
+            </a:r>
+            <a:r>
+              <a:rPr lang="de-DE" dirty="0" err="1"/>
+              <a:t>Pending-Intents</a:t>
+            </a:r>
+            <a:r>
+              <a:rPr lang="de-DE" dirty="0"/>
+              <a:t> </a:t>
+            </a:r>
+            <a:r>
+              <a:rPr lang="de-DE" b="1" dirty="0"/>
+              <a:t>müssen</a:t>
+            </a:r>
+            <a:r>
+              <a:rPr lang="de-DE" dirty="0"/>
+              <a:t> unterscheidbar sein</a:t>
+            </a:r>
           </a:p>
         </p:txBody>
       </p:sp>
@@ -9063,7 +9473,7 @@
           <p:cNvPr id="2" name="Titel 1">
             <a:extLst>
               <a:ext uri="{FF2B5EF4-FFF2-40B4-BE49-F238E27FC236}">
-                <a16:creationId xmlns:a16="http://schemas.microsoft.com/office/drawing/2014/main" id="{097F7868-3AB0-4729-A9A7-624F1715B266}"/>
+                <a16:creationId xmlns:a16="http://schemas.microsoft.com/office/drawing/2014/main" id="{62683874-672C-497D-92A4-5266DF4B571B}"/>
               </a:ext>
             </a:extLst>
           </p:cNvPr>
@@ -9080,12 +9490,8 @@
           <a:lstStyle/>
           <a:p>
             <a:r>
-              <a:rPr lang="de-DE" dirty="0" err="1"/>
-              <a:t>Notification</a:t>
-            </a:r>
-            <a:r>
               <a:rPr lang="de-DE" dirty="0"/>
-              <a:t> Groups</a:t>
+              <a:t>Messaging-Style</a:t>
             </a:r>
           </a:p>
         </p:txBody>
@@ -9095,7 +9501,7 @@
           <p:cNvPr id="3" name="Inhaltsplatzhalter 2">
             <a:extLst>
               <a:ext uri="{FF2B5EF4-FFF2-40B4-BE49-F238E27FC236}">
-                <a16:creationId xmlns:a16="http://schemas.microsoft.com/office/drawing/2014/main" id="{8951AE06-BFB2-45B9-BFFC-E55766B5BC14}"/>
+                <a16:creationId xmlns:a16="http://schemas.microsoft.com/office/drawing/2014/main" id="{61880B18-4170-440F-A49A-AFC410E56A1F}"/>
               </a:ext>
             </a:extLst>
           </p:cNvPr>
@@ -9118,7 +9524,7 @@
     </p:spTree>
     <p:extLst>
       <p:ext uri="{BB962C8B-B14F-4D97-AF65-F5344CB8AC3E}">
-        <p14:creationId xmlns:p14="http://schemas.microsoft.com/office/powerpoint/2010/main" val="3779608445"/>
+        <p14:creationId xmlns:p14="http://schemas.microsoft.com/office/powerpoint/2010/main" val="2930791039"/>
       </p:ext>
     </p:extLst>
   </p:cSld>

</xml_diff>

<commit_message>
Gliederung der Projektarbeit hinzugefügt
</commit_message>
<xml_diff>
--- a/Dokumentation/Präsentation/Push-Notifications.pptx
+++ b/Dokumentation/Präsentation/Push-Notifications.pptx
@@ -848,7 +848,7 @@
           <a:p>
             <a:fld id="{6D84748D-454D-46DF-9289-A215CF23A2F8}" type="datetimeFigureOut">
               <a:rPr lang="de-DE" smtClean="0"/>
-              <a:t>29.11.2021</a:t>
+              <a:t>06.12.2021</a:t>
             </a:fld>
             <a:endParaRPr lang="de-DE"/>
           </a:p>
@@ -1099,7 +1099,7 @@
           <a:p>
             <a:fld id="{6D84748D-454D-46DF-9289-A215CF23A2F8}" type="datetimeFigureOut">
               <a:rPr lang="de-DE" smtClean="0"/>
-              <a:t>29.11.2021</a:t>
+              <a:t>06.12.2021</a:t>
             </a:fld>
             <a:endParaRPr lang="de-DE"/>
           </a:p>
@@ -1413,7 +1413,7 @@
           <a:p>
             <a:fld id="{6D84748D-454D-46DF-9289-A215CF23A2F8}" type="datetimeFigureOut">
               <a:rPr lang="de-DE" smtClean="0"/>
-              <a:t>29.11.2021</a:t>
+              <a:t>06.12.2021</a:t>
             </a:fld>
             <a:endParaRPr lang="de-DE"/>
           </a:p>
@@ -1754,7 +1754,7 @@
           <a:p>
             <a:fld id="{6D84748D-454D-46DF-9289-A215CF23A2F8}" type="datetimeFigureOut">
               <a:rPr lang="de-DE" smtClean="0"/>
-              <a:t>29.11.2021</a:t>
+              <a:t>06.12.2021</a:t>
             </a:fld>
             <a:endParaRPr lang="de-DE"/>
           </a:p>
@@ -2068,7 +2068,7 @@
           <a:p>
             <a:fld id="{6D84748D-454D-46DF-9289-A215CF23A2F8}" type="datetimeFigureOut">
               <a:rPr lang="de-DE" smtClean="0"/>
-              <a:t>29.11.2021</a:t>
+              <a:t>06.12.2021</a:t>
             </a:fld>
             <a:endParaRPr lang="de-DE"/>
           </a:p>
@@ -2461,7 +2461,7 @@
           <a:p>
             <a:fld id="{6D84748D-454D-46DF-9289-A215CF23A2F8}" type="datetimeFigureOut">
               <a:rPr lang="de-DE" smtClean="0"/>
-              <a:t>29.11.2021</a:t>
+              <a:t>06.12.2021</a:t>
             </a:fld>
             <a:endParaRPr lang="de-DE"/>
           </a:p>
@@ -2631,7 +2631,7 @@
           <a:p>
             <a:fld id="{6D84748D-454D-46DF-9289-A215CF23A2F8}" type="datetimeFigureOut">
               <a:rPr lang="de-DE" smtClean="0"/>
-              <a:t>29.11.2021</a:t>
+              <a:t>06.12.2021</a:t>
             </a:fld>
             <a:endParaRPr lang="de-DE"/>
           </a:p>
@@ -2811,7 +2811,7 @@
           <a:p>
             <a:fld id="{6D84748D-454D-46DF-9289-A215CF23A2F8}" type="datetimeFigureOut">
               <a:rPr lang="de-DE" smtClean="0"/>
-              <a:t>29.11.2021</a:t>
+              <a:t>06.12.2021</a:t>
             </a:fld>
             <a:endParaRPr lang="de-DE"/>
           </a:p>
@@ -2987,7 +2987,7 @@
           <a:p>
             <a:fld id="{6D84748D-454D-46DF-9289-A215CF23A2F8}" type="datetimeFigureOut">
               <a:rPr lang="de-DE" smtClean="0"/>
-              <a:t>29.11.2021</a:t>
+              <a:t>06.12.2021</a:t>
             </a:fld>
             <a:endParaRPr lang="de-DE"/>
           </a:p>
@@ -3234,7 +3234,7 @@
           <a:p>
             <a:fld id="{6D84748D-454D-46DF-9289-A215CF23A2F8}" type="datetimeFigureOut">
               <a:rPr lang="de-DE" smtClean="0"/>
-              <a:t>29.11.2021</a:t>
+              <a:t>06.12.2021</a:t>
             </a:fld>
             <a:endParaRPr lang="de-DE"/>
           </a:p>
@@ -3466,7 +3466,7 @@
           <a:p>
             <a:fld id="{6D84748D-454D-46DF-9289-A215CF23A2F8}" type="datetimeFigureOut">
               <a:rPr lang="de-DE" smtClean="0"/>
-              <a:t>29.11.2021</a:t>
+              <a:t>06.12.2021</a:t>
             </a:fld>
             <a:endParaRPr lang="de-DE"/>
           </a:p>
@@ -3840,7 +3840,7 @@
           <a:p>
             <a:fld id="{6D84748D-454D-46DF-9289-A215CF23A2F8}" type="datetimeFigureOut">
               <a:rPr lang="de-DE" smtClean="0"/>
-              <a:t>29.11.2021</a:t>
+              <a:t>06.12.2021</a:t>
             </a:fld>
             <a:endParaRPr lang="de-DE"/>
           </a:p>
@@ -3963,7 +3963,7 @@
           <a:p>
             <a:fld id="{6D84748D-454D-46DF-9289-A215CF23A2F8}" type="datetimeFigureOut">
               <a:rPr lang="de-DE" smtClean="0"/>
-              <a:t>29.11.2021</a:t>
+              <a:t>06.12.2021</a:t>
             </a:fld>
             <a:endParaRPr lang="de-DE"/>
           </a:p>
@@ -4058,7 +4058,7 @@
           <a:p>
             <a:fld id="{6D84748D-454D-46DF-9289-A215CF23A2F8}" type="datetimeFigureOut">
               <a:rPr lang="de-DE" smtClean="0"/>
-              <a:t>29.11.2021</a:t>
+              <a:t>06.12.2021</a:t>
             </a:fld>
             <a:endParaRPr lang="de-DE"/>
           </a:p>
@@ -4313,7 +4313,7 @@
           <a:p>
             <a:fld id="{6D84748D-454D-46DF-9289-A215CF23A2F8}" type="datetimeFigureOut">
               <a:rPr lang="de-DE" smtClean="0"/>
-              <a:t>29.11.2021</a:t>
+              <a:t>06.12.2021</a:t>
             </a:fld>
             <a:endParaRPr lang="de-DE"/>
           </a:p>
@@ -4576,7 +4576,7 @@
           <a:p>
             <a:fld id="{6D84748D-454D-46DF-9289-A215CF23A2F8}" type="datetimeFigureOut">
               <a:rPr lang="de-DE" smtClean="0"/>
-              <a:t>29.11.2021</a:t>
+              <a:t>06.12.2021</a:t>
             </a:fld>
             <a:endParaRPr lang="de-DE"/>
           </a:p>
@@ -5319,7 +5319,7 @@
           <a:p>
             <a:fld id="{6D84748D-454D-46DF-9289-A215CF23A2F8}" type="datetimeFigureOut">
               <a:rPr lang="de-DE" smtClean="0"/>
-              <a:t>29.11.2021</a:t>
+              <a:t>06.12.2021</a:t>
             </a:fld>
             <a:endParaRPr lang="de-DE"/>
           </a:p>
@@ -11764,8 +11764,13 @@
             </a:r>
             <a:r>
               <a:rPr lang="de-DE" dirty="0"/>
-              <a:t> unterscheidbar sein</a:t>
-            </a:r>
+              <a:t> </a:t>
+            </a:r>
+            <a:r>
+              <a:rPr lang="de-DE"/>
+              <a:t>unterscheidbar sein</a:t>
+            </a:r>
+            <a:endParaRPr lang="de-DE" dirty="0"/>
           </a:p>
           <a:p>
             <a:r>

</xml_diff>